<commit_message>
ppt - elso resz
</commit_message>
<xml_diff>
--- a/Dokumentacio/Eloadas.pptx
+++ b/Dokumentacio/Eloadas.pptx
@@ -275,7 +275,7 @@
           <a:p>
             <a:fld id="{20C65D48-B2C4-4DFB-A7D8-E0250F9D67EA}" type="datetimeFigureOut">
               <a:rPr lang="hu-HU" smtClean="0"/>
-              <a:t>2025. 04. 11.</a:t>
+              <a:t>2025. 04. 12.</a:t>
             </a:fld>
             <a:endParaRPr lang="hu-HU"/>
           </a:p>
@@ -473,7 +473,7 @@
           <a:p>
             <a:fld id="{20C65D48-B2C4-4DFB-A7D8-E0250F9D67EA}" type="datetimeFigureOut">
               <a:rPr lang="hu-HU" smtClean="0"/>
-              <a:t>2025. 04. 11.</a:t>
+              <a:t>2025. 04. 12.</a:t>
             </a:fld>
             <a:endParaRPr lang="hu-HU"/>
           </a:p>
@@ -681,7 +681,7 @@
           <a:p>
             <a:fld id="{20C65D48-B2C4-4DFB-A7D8-E0250F9D67EA}" type="datetimeFigureOut">
               <a:rPr lang="hu-HU" smtClean="0"/>
-              <a:t>2025. 04. 11.</a:t>
+              <a:t>2025. 04. 12.</a:t>
             </a:fld>
             <a:endParaRPr lang="hu-HU"/>
           </a:p>
@@ -879,7 +879,7 @@
           <a:p>
             <a:fld id="{20C65D48-B2C4-4DFB-A7D8-E0250F9D67EA}" type="datetimeFigureOut">
               <a:rPr lang="hu-HU" smtClean="0"/>
-              <a:t>2025. 04. 11.</a:t>
+              <a:t>2025. 04. 12.</a:t>
             </a:fld>
             <a:endParaRPr lang="hu-HU"/>
           </a:p>
@@ -1154,7 +1154,7 @@
           <a:p>
             <a:fld id="{20C65D48-B2C4-4DFB-A7D8-E0250F9D67EA}" type="datetimeFigureOut">
               <a:rPr lang="hu-HU" smtClean="0"/>
-              <a:t>2025. 04. 11.</a:t>
+              <a:t>2025. 04. 12.</a:t>
             </a:fld>
             <a:endParaRPr lang="hu-HU"/>
           </a:p>
@@ -1419,7 +1419,7 @@
           <a:p>
             <a:fld id="{20C65D48-B2C4-4DFB-A7D8-E0250F9D67EA}" type="datetimeFigureOut">
               <a:rPr lang="hu-HU" smtClean="0"/>
-              <a:t>2025. 04. 11.</a:t>
+              <a:t>2025. 04. 12.</a:t>
             </a:fld>
             <a:endParaRPr lang="hu-HU"/>
           </a:p>
@@ -1831,7 +1831,7 @@
           <a:p>
             <a:fld id="{20C65D48-B2C4-4DFB-A7D8-E0250F9D67EA}" type="datetimeFigureOut">
               <a:rPr lang="hu-HU" smtClean="0"/>
-              <a:t>2025. 04. 11.</a:t>
+              <a:t>2025. 04. 12.</a:t>
             </a:fld>
             <a:endParaRPr lang="hu-HU"/>
           </a:p>
@@ -1972,7 +1972,7 @@
           <a:p>
             <a:fld id="{20C65D48-B2C4-4DFB-A7D8-E0250F9D67EA}" type="datetimeFigureOut">
               <a:rPr lang="hu-HU" smtClean="0"/>
-              <a:t>2025. 04. 11.</a:t>
+              <a:t>2025. 04. 12.</a:t>
             </a:fld>
             <a:endParaRPr lang="hu-HU"/>
           </a:p>
@@ -2085,7 +2085,7 @@
           <a:p>
             <a:fld id="{20C65D48-B2C4-4DFB-A7D8-E0250F9D67EA}" type="datetimeFigureOut">
               <a:rPr lang="hu-HU" smtClean="0"/>
-              <a:t>2025. 04. 11.</a:t>
+              <a:t>2025. 04. 12.</a:t>
             </a:fld>
             <a:endParaRPr lang="hu-HU"/>
           </a:p>
@@ -2396,7 +2396,7 @@
           <a:p>
             <a:fld id="{20C65D48-B2C4-4DFB-A7D8-E0250F9D67EA}" type="datetimeFigureOut">
               <a:rPr lang="hu-HU" smtClean="0"/>
-              <a:t>2025. 04. 11.</a:t>
+              <a:t>2025. 04. 12.</a:t>
             </a:fld>
             <a:endParaRPr lang="hu-HU"/>
           </a:p>
@@ -2684,7 +2684,7 @@
           <a:p>
             <a:fld id="{20C65D48-B2C4-4DFB-A7D8-E0250F9D67EA}" type="datetimeFigureOut">
               <a:rPr lang="hu-HU" smtClean="0"/>
-              <a:t>2025. 04. 11.</a:t>
+              <a:t>2025. 04. 12.</a:t>
             </a:fld>
             <a:endParaRPr lang="hu-HU"/>
           </a:p>
@@ -2925,7 +2925,7 @@
           <a:p>
             <a:fld id="{20C65D48-B2C4-4DFB-A7D8-E0250F9D67EA}" type="datetimeFigureOut">
               <a:rPr lang="hu-HU" smtClean="0"/>
-              <a:t>2025. 04. 11.</a:t>
+              <a:t>2025. 04. 12.</a:t>
             </a:fld>
             <a:endParaRPr lang="hu-HU"/>
           </a:p>
@@ -3328,6 +3328,14 @@
 <file path=ppt/slides/slide1.xml><?xml version="1.0" encoding="utf-8"?>
 <p:sld xmlns:a="http://schemas.openxmlformats.org/drawingml/2006/main" xmlns:r="http://schemas.openxmlformats.org/officeDocument/2006/relationships" xmlns:p="http://schemas.openxmlformats.org/presentationml/2006/main">
   <p:cSld>
+    <p:bg>
+      <p:bgPr>
+        <a:solidFill>
+          <a:srgbClr val="1758F2"/>
+        </a:solidFill>
+        <a:effectLst/>
+      </p:bgPr>
+    </p:bg>
     <p:spTree>
       <p:nvGrpSpPr>
         <p:cNvPr id="1" name=""/>
@@ -3358,7 +3366,12 @@
             <p:ph type="ctrTitle"/>
           </p:nvPr>
         </p:nvSpPr>
-        <p:spPr/>
+        <p:spPr>
+          <a:xfrm>
+            <a:off x="1457324" y="712382"/>
+            <a:ext cx="9144000" cy="1404938"/>
+          </a:xfrm>
+        </p:spPr>
         <p:txBody>
           <a:bodyPr>
             <a:normAutofit/>
@@ -3366,10 +3379,18 @@
           <a:lstStyle/>
           <a:p>
             <a:r>
-              <a:rPr lang="hu-HU" sz="8000" dirty="0" err="1"/>
+              <a:rPr lang="hu-HU" sz="8800" dirty="0" err="1">
+                <a:solidFill>
+                  <a:schemeClr val="bg1"/>
+                </a:solidFill>
+              </a:rPr>
               <a:t>telock</a:t>
             </a:r>
-            <a:endParaRPr lang="hu-HU" sz="8000" dirty="0"/>
+            <a:endParaRPr lang="hu-HU" sz="8800" dirty="0">
+              <a:solidFill>
+                <a:schemeClr val="bg1"/>
+              </a:solidFill>
+            </a:endParaRPr>
           </a:p>
         </p:txBody>
       </p:sp>
@@ -3389,7 +3410,12 @@
             <p:ph type="subTitle" idx="1"/>
           </p:nvPr>
         </p:nvSpPr>
-        <p:spPr/>
+        <p:spPr>
+          <a:xfrm>
+            <a:off x="1381125" y="2597788"/>
+            <a:ext cx="9144000" cy="749931"/>
+          </a:xfrm>
+        </p:spPr>
         <p:txBody>
           <a:bodyPr>
             <a:normAutofit/>
@@ -3397,9 +3423,198 @@
           <a:lstStyle/>
           <a:p>
             <a:r>
-              <a:rPr lang="hu-HU" sz="2800" dirty="0"/>
+              <a:rPr lang="hu-HU" sz="2800" dirty="0">
+                <a:solidFill>
+                  <a:schemeClr val="bg1"/>
+                </a:solidFill>
+              </a:rPr>
               <a:t>Készítette: Nagy Gábor és Szalkai-Szabó Ádám</a:t>
             </a:r>
+          </a:p>
+        </p:txBody>
+      </p:sp>
+      <p:sp>
+        <p:nvSpPr>
+          <p:cNvPr id="8" name="Téglalap 7">
+            <a:extLst>
+              <a:ext uri="{FF2B5EF4-FFF2-40B4-BE49-F238E27FC236}">
+                <a16:creationId xmlns:a16="http://schemas.microsoft.com/office/drawing/2014/main" id="{D9ED47E0-A0F5-AAEC-91CC-AF70D9F194D7}"/>
+              </a:ext>
+            </a:extLst>
+          </p:cNvPr>
+          <p:cNvSpPr/>
+          <p:nvPr/>
+        </p:nvSpPr>
+        <p:spPr>
+          <a:xfrm>
+            <a:off x="0" y="3429001"/>
+            <a:ext cx="12192000" cy="3428998"/>
+          </a:xfrm>
+          <a:prstGeom prst="rect">
+            <a:avLst/>
+          </a:prstGeom>
+          <a:solidFill>
+            <a:schemeClr val="bg1"/>
+          </a:solidFill>
+        </p:spPr>
+        <p:style>
+          <a:lnRef idx="2">
+            <a:schemeClr val="accent1">
+              <a:shade val="15000"/>
+            </a:schemeClr>
+          </a:lnRef>
+          <a:fillRef idx="1">
+            <a:schemeClr val="accent1"/>
+          </a:fillRef>
+          <a:effectRef idx="0">
+            <a:schemeClr val="accent1"/>
+          </a:effectRef>
+          <a:fontRef idx="minor">
+            <a:schemeClr val="lt1"/>
+          </a:fontRef>
+        </p:style>
+        <p:txBody>
+          <a:bodyPr rtlCol="0" anchor="ctr"/>
+          <a:lstStyle/>
+          <a:p>
+            <a:pPr algn="ctr"/>
+            <a:endParaRPr lang="hu-HU" dirty="0"/>
+          </a:p>
+        </p:txBody>
+      </p:sp>
+      <p:sp>
+        <p:nvSpPr>
+          <p:cNvPr id="10" name="Szövegdoboz 9">
+            <a:extLst>
+              <a:ext uri="{FF2B5EF4-FFF2-40B4-BE49-F238E27FC236}">
+                <a16:creationId xmlns:a16="http://schemas.microsoft.com/office/drawing/2014/main" id="{A645E178-5FD9-4972-C31F-DCA39D6F9E30}"/>
+              </a:ext>
+            </a:extLst>
+          </p:cNvPr>
+          <p:cNvSpPr txBox="1"/>
+          <p:nvPr/>
+        </p:nvSpPr>
+        <p:spPr>
+          <a:xfrm>
+            <a:off x="1226344" y="4647426"/>
+            <a:ext cx="3317081" cy="1569660"/>
+          </a:xfrm>
+          <a:prstGeom prst="rect">
+            <a:avLst/>
+          </a:prstGeom>
+          <a:noFill/>
+        </p:spPr>
+        <p:txBody>
+          <a:bodyPr wrap="square">
+            <a:spAutoFit/>
+          </a:bodyPr>
+          <a:lstStyle/>
+          <a:p>
+            <a:r>
+              <a:rPr lang="hu-HU" sz="2400" b="1" dirty="0"/>
+              <a:t>Kiskunfélegyházi Szent Benedek PG Két Tanítási Nyelvű Technikum és Kollégium</a:t>
+            </a:r>
+          </a:p>
+        </p:txBody>
+      </p:sp>
+      <p:pic>
+        <p:nvPicPr>
+          <p:cNvPr id="12" name="Kép 11" descr="A képen kör, Betűtípus, szimbólum, tervezés látható&#10;&#10;Előfordulhat, hogy a mesterséges intelligencia által létrehozott tartalom helytelen.">
+            <a:extLst>
+              <a:ext uri="{FF2B5EF4-FFF2-40B4-BE49-F238E27FC236}">
+                <a16:creationId xmlns:a16="http://schemas.microsoft.com/office/drawing/2014/main" id="{F925935A-526E-B5A0-C23B-916D0938AF23}"/>
+              </a:ext>
+            </a:extLst>
+          </p:cNvPr>
+          <p:cNvPicPr>
+            <a:picLocks noChangeAspect="1"/>
+          </p:cNvPicPr>
+          <p:nvPr/>
+        </p:nvPicPr>
+        <p:blipFill>
+          <a:blip r:embed="rId2">
+            <a:extLst>
+              <a:ext uri="{28A0092B-C50C-407E-A947-70E740481C1C}">
+                <a14:useLocalDpi xmlns:a14="http://schemas.microsoft.com/office/drawing/2010/main" val="0"/>
+              </a:ext>
+            </a:extLst>
+          </a:blip>
+          <a:stretch>
+            <a:fillRect/>
+          </a:stretch>
+        </p:blipFill>
+        <p:spPr>
+          <a:xfrm>
+            <a:off x="4957762" y="4381499"/>
+            <a:ext cx="2143125" cy="2143125"/>
+          </a:xfrm>
+          <a:prstGeom prst="rect">
+            <a:avLst/>
+          </a:prstGeom>
+        </p:spPr>
+      </p:pic>
+      <p:sp>
+        <p:nvSpPr>
+          <p:cNvPr id="13" name="Szövegdoboz 12">
+            <a:extLst>
+              <a:ext uri="{FF2B5EF4-FFF2-40B4-BE49-F238E27FC236}">
+                <a16:creationId xmlns:a16="http://schemas.microsoft.com/office/drawing/2014/main" id="{956E6E1C-9782-164C-3668-CFC0634CD365}"/>
+              </a:ext>
+            </a:extLst>
+          </p:cNvPr>
+          <p:cNvSpPr txBox="1"/>
+          <p:nvPr/>
+        </p:nvSpPr>
+        <p:spPr>
+          <a:xfrm>
+            <a:off x="7515225" y="4647426"/>
+            <a:ext cx="3450432" cy="1754326"/>
+          </a:xfrm>
+          <a:prstGeom prst="rect">
+            <a:avLst/>
+          </a:prstGeom>
+          <a:noFill/>
+        </p:spPr>
+        <p:txBody>
+          <a:bodyPr wrap="square" rtlCol="0">
+            <a:spAutoFit/>
+          </a:bodyPr>
+          <a:lstStyle/>
+          <a:p>
+            <a:r>
+              <a:rPr lang="hu-HU" dirty="0">
+                <a:effectLst/>
+              </a:rPr>
+              <a:t>Kiskunfélegyháza, Kossuth Lajos u. 24, 6100</a:t>
+            </a:r>
+          </a:p>
+          <a:p>
+            <a:r>
+              <a:rPr lang="hu-HU" dirty="0"/>
+              <a:t>OM: 203365</a:t>
+            </a:r>
+          </a:p>
+          <a:p>
+            <a:r>
+              <a:rPr lang="hu-HU" dirty="0">
+                <a:effectLst/>
+              </a:rPr>
+              <a:t>+36 76462 332</a:t>
+            </a:r>
+          </a:p>
+          <a:p>
+            <a:r>
+              <a:rPr lang="hu-HU" dirty="0"/>
+              <a:t>titkarsag@szbi-pg.hu</a:t>
+            </a:r>
+            <a:endParaRPr lang="hu-HU" dirty="0">
+              <a:effectLst/>
+            </a:endParaRPr>
+          </a:p>
+          <a:p>
+            <a:endParaRPr lang="hu-HU" dirty="0">
+              <a:effectLst/>
+            </a:endParaRPr>
           </a:p>
         </p:txBody>
       </p:sp>
@@ -4505,6 +4720,55 @@
       </p:grpSpPr>
       <p:sp>
         <p:nvSpPr>
+          <p:cNvPr id="6" name="Téglalap 5">
+            <a:extLst>
+              <a:ext uri="{FF2B5EF4-FFF2-40B4-BE49-F238E27FC236}">
+                <a16:creationId xmlns:a16="http://schemas.microsoft.com/office/drawing/2014/main" id="{BC279235-BB80-2621-AB21-348D3C6063F6}"/>
+              </a:ext>
+            </a:extLst>
+          </p:cNvPr>
+          <p:cNvSpPr/>
+          <p:nvPr/>
+        </p:nvSpPr>
+        <p:spPr>
+          <a:xfrm>
+            <a:off x="-1" y="0"/>
+            <a:ext cx="12192001" cy="3429000"/>
+          </a:xfrm>
+          <a:prstGeom prst="rect">
+            <a:avLst/>
+          </a:prstGeom>
+          <a:solidFill>
+            <a:srgbClr val="1758F2"/>
+          </a:solidFill>
+        </p:spPr>
+        <p:style>
+          <a:lnRef idx="2">
+            <a:schemeClr val="accent1">
+              <a:shade val="15000"/>
+            </a:schemeClr>
+          </a:lnRef>
+          <a:fillRef idx="1">
+            <a:schemeClr val="accent1"/>
+          </a:fillRef>
+          <a:effectRef idx="0">
+            <a:schemeClr val="accent1"/>
+          </a:effectRef>
+          <a:fontRef idx="minor">
+            <a:schemeClr val="lt1"/>
+          </a:fontRef>
+        </p:style>
+        <p:txBody>
+          <a:bodyPr rtlCol="0" anchor="ctr"/>
+          <a:lstStyle/>
+          <a:p>
+            <a:pPr algn="ctr"/>
+            <a:endParaRPr lang="hu-HU" dirty="0"/>
+          </a:p>
+        </p:txBody>
+      </p:sp>
+      <p:sp>
+        <p:nvSpPr>
           <p:cNvPr id="2" name="Cím 1">
             <a:extLst>
               <a:ext uri="{FF2B5EF4-FFF2-40B4-BE49-F238E27FC236}">
@@ -4524,13 +4788,20 @@
             <a:off x="838200" y="220746"/>
             <a:ext cx="10515600" cy="1325563"/>
           </a:xfrm>
+          <a:solidFill>
+            <a:srgbClr val="1758F2"/>
+          </a:solidFill>
         </p:spPr>
         <p:txBody>
           <a:bodyPr/>
           <a:lstStyle/>
           <a:p>
             <a:r>
-              <a:rPr lang="hu-HU" dirty="0"/>
+              <a:rPr lang="hu-HU" dirty="0">
+                <a:solidFill>
+                  <a:schemeClr val="bg1"/>
+                </a:solidFill>
+              </a:rPr>
               <a:t>A probléma</a:t>
             </a:r>
           </a:p>
@@ -4559,13 +4830,31 @@
           </a:xfrm>
         </p:spPr>
         <p:txBody>
-          <a:bodyPr/>
-          <a:lstStyle/>
-          <a:p>
-            <a:r>
-              <a:rPr lang="hu-HU" dirty="0" err="1"/>
-              <a:t>dd</a:t>
-            </a:r>
+          <a:bodyPr>
+            <a:normAutofit fontScale="85000" lnSpcReduction="10000"/>
+          </a:bodyPr>
+          <a:lstStyle/>
+          <a:p>
+            <a:r>
+              <a:rPr lang="hu-HU" dirty="0"/>
+              <a:t>A </a:t>
+            </a:r>
+            <a:r>
+              <a:rPr lang="hu-HU" b="1" dirty="0"/>
+              <a:t>TELOCK</a:t>
+            </a:r>
+            <a:r>
+              <a:rPr lang="hu-HU" dirty="0"/>
+              <a:t> egy iskolák számára fejlesztett rendszer, amely webes vezérlőpultból és fizikai tárolókból áll, hogy szabályozza a tanulók mobiltelefon-használatát.</a:t>
+            </a:r>
+          </a:p>
+          <a:p>
+            <a:r>
+              <a:rPr lang="hu-HU" dirty="0"/>
+              <a:t>A rendszer lehetővé teszi a telefonok biztonságos elzárását és az iskolai dolgozók általi ellenőrzését, ezzel támogatva a 2024-es kormányrendelet betartását.</a:t>
+            </a:r>
+          </a:p>
+          <a:p>
             <a:endParaRPr lang="hu-HU" dirty="0"/>
           </a:p>
         </p:txBody>
@@ -4649,7 +4938,7 @@
         </p:spPr>
         <p:txBody>
           <a:bodyPr vert="horz" lIns="91440" tIns="45720" rIns="91440" bIns="45720" rtlCol="0">
-            <a:normAutofit/>
+            <a:normAutofit fontScale="62500" lnSpcReduction="20000"/>
           </a:bodyPr>
           <a:lstStyle>
             <a:lvl1pPr marL="228600" indent="-228600" algn="l" defTabSz="914400" rtl="0" eaLnBrk="1" latinLnBrk="0" hangingPunct="1">
@@ -4817,10 +5106,33 @@
           </a:lstStyle>
           <a:p>
             <a:r>
-              <a:rPr lang="hu-HU" dirty="0" err="1"/>
-              <a:t>dd</a:t>
-            </a:r>
-            <a:endParaRPr lang="hu-HU" dirty="0"/>
+              <a:rPr lang="hu-HU" dirty="0">
+                <a:solidFill>
+                  <a:schemeClr val="bg1"/>
+                </a:solidFill>
+              </a:rPr>
+              <a:t>A tanulók órák alatti mobiltelefon-használata rontja a koncentrációt és a tanulmányi teljesítményt.</a:t>
+            </a:r>
+          </a:p>
+          <a:p>
+            <a:r>
+              <a:rPr lang="hu-HU" dirty="0">
+                <a:solidFill>
+                  <a:schemeClr val="bg1"/>
+                </a:solidFill>
+              </a:rPr>
+              <a:t>2024 szeptember 1-től kormányrendelet írja elő, hogy a diákoknak tanítási idő alatt le kell adniuk a mobiltelefonjaikat.</a:t>
+            </a:r>
+          </a:p>
+          <a:p>
+            <a:r>
+              <a:rPr lang="hu-HU" dirty="0">
+                <a:solidFill>
+                  <a:schemeClr val="bg1"/>
+                </a:solidFill>
+              </a:rPr>
+              <a:t>Az iskoláknak szükségük van egy biztonságos, ellenőrizhető megoldásra a telefonok tárolására és kezelésére.</a:t>
+            </a:r>
           </a:p>
         </p:txBody>
       </p:sp>
@@ -4840,6 +5152,14 @@
 <file path=ppt/slides/slide3.xml><?xml version="1.0" encoding="utf-8"?>
 <p:sld xmlns:a="http://schemas.openxmlformats.org/drawingml/2006/main" xmlns:r="http://schemas.openxmlformats.org/officeDocument/2006/relationships" xmlns:p="http://schemas.openxmlformats.org/presentationml/2006/main">
   <p:cSld>
+    <p:bg>
+      <p:bgPr>
+        <a:solidFill>
+          <a:srgbClr val="1758F2"/>
+        </a:solidFill>
+        <a:effectLst/>
+      </p:bgPr>
+    </p:bg>
     <p:spTree>
       <p:nvGrpSpPr>
         <p:cNvPr id="1" name=""/>
@@ -4856,6 +5176,55 @@
       </p:grpSpPr>
       <p:sp>
         <p:nvSpPr>
+          <p:cNvPr id="10" name="Téglalap 9">
+            <a:extLst>
+              <a:ext uri="{FF2B5EF4-FFF2-40B4-BE49-F238E27FC236}">
+                <a16:creationId xmlns:a16="http://schemas.microsoft.com/office/drawing/2014/main" id="{D6F64EEC-6BB8-D240-CED4-43161C1FCA4E}"/>
+              </a:ext>
+            </a:extLst>
+          </p:cNvPr>
+          <p:cNvSpPr/>
+          <p:nvPr/>
+        </p:nvSpPr>
+        <p:spPr>
+          <a:xfrm>
+            <a:off x="0" y="3429000"/>
+            <a:ext cx="12192000" cy="3429000"/>
+          </a:xfrm>
+          <a:prstGeom prst="rect">
+            <a:avLst/>
+          </a:prstGeom>
+          <a:solidFill>
+            <a:schemeClr val="bg1"/>
+          </a:solidFill>
+        </p:spPr>
+        <p:style>
+          <a:lnRef idx="2">
+            <a:schemeClr val="accent1">
+              <a:shade val="15000"/>
+            </a:schemeClr>
+          </a:lnRef>
+          <a:fillRef idx="1">
+            <a:schemeClr val="accent1"/>
+          </a:fillRef>
+          <a:effectRef idx="0">
+            <a:schemeClr val="accent1"/>
+          </a:effectRef>
+          <a:fontRef idx="minor">
+            <a:schemeClr val="lt1"/>
+          </a:fontRef>
+        </p:style>
+        <p:txBody>
+          <a:bodyPr rtlCol="0" anchor="ctr"/>
+          <a:lstStyle/>
+          <a:p>
+            <a:pPr algn="ctr"/>
+            <a:endParaRPr lang="hu-HU"/>
+          </a:p>
+        </p:txBody>
+      </p:sp>
+      <p:sp>
+        <p:nvSpPr>
           <p:cNvPr id="2" name="Cím 1">
             <a:extLst>
               <a:ext uri="{FF2B5EF4-FFF2-40B4-BE49-F238E27FC236}">
@@ -4870,40 +5239,626 @@
             <p:ph type="title"/>
           </p:nvPr>
         </p:nvSpPr>
-        <p:spPr/>
+        <p:spPr>
+          <a:xfrm>
+            <a:off x="707166" y="506610"/>
+            <a:ext cx="5038928" cy="1325563"/>
+          </a:xfrm>
+        </p:spPr>
         <p:txBody>
           <a:bodyPr/>
           <a:lstStyle/>
           <a:p>
             <a:r>
+              <a:rPr lang="hu-HU" dirty="0">
+                <a:solidFill>
+                  <a:schemeClr val="bg1"/>
+                </a:solidFill>
+              </a:rPr>
+              <a:t>A rendszer funkció</a:t>
+            </a:r>
+          </a:p>
+        </p:txBody>
+      </p:sp>
+      <p:sp>
+        <p:nvSpPr>
+          <p:cNvPr id="3" name="Tartalom helye 2">
+            <a:extLst>
+              <a:ext uri="{FF2B5EF4-FFF2-40B4-BE49-F238E27FC236}">
+                <a16:creationId xmlns:a16="http://schemas.microsoft.com/office/drawing/2014/main" id="{C9CFCC54-EEC1-45F1-95DE-451361C20F30}"/>
+              </a:ext>
+            </a:extLst>
+          </p:cNvPr>
+          <p:cNvSpPr>
+            <a:spLocks noGrp="1"/>
+          </p:cNvSpPr>
+          <p:nvPr>
+            <p:ph idx="1"/>
+          </p:nvPr>
+        </p:nvSpPr>
+        <p:spPr>
+          <a:xfrm>
+            <a:off x="2306391" y="4484177"/>
+            <a:ext cx="3789609" cy="2371016"/>
+          </a:xfrm>
+          <a:solidFill>
+            <a:schemeClr val="bg1"/>
+          </a:solidFill>
+          <a:effectLst/>
+        </p:spPr>
+        <p:txBody>
+          <a:bodyPr>
+            <a:normAutofit fontScale="77500" lnSpcReduction="20000"/>
+          </a:bodyPr>
+          <a:lstStyle/>
+          <a:p>
+            <a:r>
               <a:rPr lang="hu-HU" dirty="0"/>
-              <a:t>Funkciók</a:t>
-            </a:r>
-          </a:p>
-        </p:txBody>
-      </p:sp>
-      <p:sp>
-        <p:nvSpPr>
-          <p:cNvPr id="3" name="Tartalom helye 2">
-            <a:extLst>
-              <a:ext uri="{FF2B5EF4-FFF2-40B4-BE49-F238E27FC236}">
-                <a16:creationId xmlns:a16="http://schemas.microsoft.com/office/drawing/2014/main" id="{C9CFCC54-EEC1-45F1-95DE-451361C20F30}"/>
-              </a:ext>
-            </a:extLst>
-          </p:cNvPr>
-          <p:cNvSpPr>
-            <a:spLocks noGrp="1"/>
-          </p:cNvSpPr>
-          <p:nvPr>
-            <p:ph idx="1"/>
-          </p:nvPr>
-        </p:nvSpPr>
-        <p:spPr/>
-        <p:txBody>
-          <a:bodyPr/>
-          <a:lstStyle/>
-          <a:p>
-            <a:endParaRPr lang="hu-HU"/>
+              <a:t>Beléptetés és jogosultságok</a:t>
+            </a:r>
+          </a:p>
+          <a:p>
+            <a:r>
+              <a:rPr lang="hu-HU" dirty="0"/>
+              <a:t>Alkalmazottak kezelése</a:t>
+            </a:r>
+          </a:p>
+          <a:p>
+            <a:r>
+              <a:rPr lang="hu-HU" dirty="0"/>
+              <a:t>Tanulók kezelése</a:t>
+            </a:r>
+          </a:p>
+          <a:p>
+            <a:r>
+              <a:rPr lang="hu-HU" dirty="0"/>
+              <a:t>Tárolók kezelése</a:t>
+            </a:r>
+          </a:p>
+          <a:p>
+            <a:r>
+              <a:rPr lang="hu-HU" dirty="0"/>
+              <a:t>Órarend-kezelés</a:t>
+            </a:r>
+            <a:endParaRPr lang="hu-HU" b="1" dirty="0"/>
+          </a:p>
+          <a:p>
+            <a:r>
+              <a:rPr lang="hu-HU" dirty="0"/>
+              <a:t>Tanév kezelése</a:t>
+            </a:r>
+          </a:p>
+        </p:txBody>
+      </p:sp>
+      <p:sp>
+        <p:nvSpPr>
+          <p:cNvPr id="11" name="Tartalom helye 2">
+            <a:extLst>
+              <a:ext uri="{FF2B5EF4-FFF2-40B4-BE49-F238E27FC236}">
+                <a16:creationId xmlns:a16="http://schemas.microsoft.com/office/drawing/2014/main" id="{67C6172A-31E7-075E-A4A0-15D1A969707D}"/>
+              </a:ext>
+            </a:extLst>
+          </p:cNvPr>
+          <p:cNvSpPr txBox="1">
+            <a:spLocks/>
+          </p:cNvSpPr>
+          <p:nvPr/>
+        </p:nvSpPr>
+        <p:spPr>
+          <a:xfrm>
+            <a:off x="6543049" y="4484177"/>
+            <a:ext cx="4379271" cy="2371016"/>
+          </a:xfrm>
+          <a:prstGeom prst="rect">
+            <a:avLst/>
+          </a:prstGeom>
+          <a:solidFill>
+            <a:schemeClr val="bg1"/>
+          </a:solidFill>
+          <a:effectLst/>
+        </p:spPr>
+        <p:txBody>
+          <a:bodyPr vert="horz" lIns="91440" tIns="45720" rIns="91440" bIns="45720" rtlCol="0">
+            <a:normAutofit fontScale="77500" lnSpcReduction="20000"/>
+          </a:bodyPr>
+          <a:lstStyle>
+            <a:lvl1pPr marL="228600" indent="-228600" algn="l" defTabSz="914400" rtl="0" eaLnBrk="1" latinLnBrk="0" hangingPunct="1">
+              <a:lnSpc>
+                <a:spcPct val="90000"/>
+              </a:lnSpc>
+              <a:spcBef>
+                <a:spcPts val="1000"/>
+              </a:spcBef>
+              <a:buFont typeface="Arial" panose="020B0604020202020204" pitchFamily="34" charset="0"/>
+              <a:buChar char="•"/>
+              <a:defRPr sz="2800" kern="1200">
+                <a:solidFill>
+                  <a:schemeClr val="tx1"/>
+                </a:solidFill>
+                <a:latin typeface="+mn-lt"/>
+                <a:ea typeface="+mn-ea"/>
+                <a:cs typeface="+mn-cs"/>
+              </a:defRPr>
+            </a:lvl1pPr>
+            <a:lvl2pPr marL="685800" indent="-228600" algn="l" defTabSz="914400" rtl="0" eaLnBrk="1" latinLnBrk="0" hangingPunct="1">
+              <a:lnSpc>
+                <a:spcPct val="90000"/>
+              </a:lnSpc>
+              <a:spcBef>
+                <a:spcPts val="500"/>
+              </a:spcBef>
+              <a:buFont typeface="Arial" panose="020B0604020202020204" pitchFamily="34" charset="0"/>
+              <a:buChar char="•"/>
+              <a:defRPr sz="2400" kern="1200">
+                <a:solidFill>
+                  <a:schemeClr val="tx1"/>
+                </a:solidFill>
+                <a:latin typeface="+mn-lt"/>
+                <a:ea typeface="+mn-ea"/>
+                <a:cs typeface="+mn-cs"/>
+              </a:defRPr>
+            </a:lvl2pPr>
+            <a:lvl3pPr marL="1143000" indent="-228600" algn="l" defTabSz="914400" rtl="0" eaLnBrk="1" latinLnBrk="0" hangingPunct="1">
+              <a:lnSpc>
+                <a:spcPct val="90000"/>
+              </a:lnSpc>
+              <a:spcBef>
+                <a:spcPts val="500"/>
+              </a:spcBef>
+              <a:buFont typeface="Arial" panose="020B0604020202020204" pitchFamily="34" charset="0"/>
+              <a:buChar char="•"/>
+              <a:defRPr sz="2000" kern="1200">
+                <a:solidFill>
+                  <a:schemeClr val="tx1"/>
+                </a:solidFill>
+                <a:latin typeface="+mn-lt"/>
+                <a:ea typeface="+mn-ea"/>
+                <a:cs typeface="+mn-cs"/>
+              </a:defRPr>
+            </a:lvl3pPr>
+            <a:lvl4pPr marL="1600200" indent="-228600" algn="l" defTabSz="914400" rtl="0" eaLnBrk="1" latinLnBrk="0" hangingPunct="1">
+              <a:lnSpc>
+                <a:spcPct val="90000"/>
+              </a:lnSpc>
+              <a:spcBef>
+                <a:spcPts val="500"/>
+              </a:spcBef>
+              <a:buFont typeface="Arial" panose="020B0604020202020204" pitchFamily="34" charset="0"/>
+              <a:buChar char="•"/>
+              <a:defRPr sz="1800" kern="1200">
+                <a:solidFill>
+                  <a:schemeClr val="tx1"/>
+                </a:solidFill>
+                <a:latin typeface="+mn-lt"/>
+                <a:ea typeface="+mn-ea"/>
+                <a:cs typeface="+mn-cs"/>
+              </a:defRPr>
+            </a:lvl4pPr>
+            <a:lvl5pPr marL="2057400" indent="-228600" algn="l" defTabSz="914400" rtl="0" eaLnBrk="1" latinLnBrk="0" hangingPunct="1">
+              <a:lnSpc>
+                <a:spcPct val="90000"/>
+              </a:lnSpc>
+              <a:spcBef>
+                <a:spcPts val="500"/>
+              </a:spcBef>
+              <a:buFont typeface="Arial" panose="020B0604020202020204" pitchFamily="34" charset="0"/>
+              <a:buChar char="•"/>
+              <a:defRPr sz="1800" kern="1200">
+                <a:solidFill>
+                  <a:schemeClr val="tx1"/>
+                </a:solidFill>
+                <a:latin typeface="+mn-lt"/>
+                <a:ea typeface="+mn-ea"/>
+                <a:cs typeface="+mn-cs"/>
+              </a:defRPr>
+            </a:lvl5pPr>
+            <a:lvl6pPr marL="2514600" indent="-228600" algn="l" defTabSz="914400" rtl="0" eaLnBrk="1" latinLnBrk="0" hangingPunct="1">
+              <a:lnSpc>
+                <a:spcPct val="90000"/>
+              </a:lnSpc>
+              <a:spcBef>
+                <a:spcPts val="500"/>
+              </a:spcBef>
+              <a:buFont typeface="Arial" panose="020B0604020202020204" pitchFamily="34" charset="0"/>
+              <a:buChar char="•"/>
+              <a:defRPr sz="1800" kern="1200">
+                <a:solidFill>
+                  <a:schemeClr val="tx1"/>
+                </a:solidFill>
+                <a:latin typeface="+mn-lt"/>
+                <a:ea typeface="+mn-ea"/>
+                <a:cs typeface="+mn-cs"/>
+              </a:defRPr>
+            </a:lvl6pPr>
+            <a:lvl7pPr marL="2971800" indent="-228600" algn="l" defTabSz="914400" rtl="0" eaLnBrk="1" latinLnBrk="0" hangingPunct="1">
+              <a:lnSpc>
+                <a:spcPct val="90000"/>
+              </a:lnSpc>
+              <a:spcBef>
+                <a:spcPts val="500"/>
+              </a:spcBef>
+              <a:buFont typeface="Arial" panose="020B0604020202020204" pitchFamily="34" charset="0"/>
+              <a:buChar char="•"/>
+              <a:defRPr sz="1800" kern="1200">
+                <a:solidFill>
+                  <a:schemeClr val="tx1"/>
+                </a:solidFill>
+                <a:latin typeface="+mn-lt"/>
+                <a:ea typeface="+mn-ea"/>
+                <a:cs typeface="+mn-cs"/>
+              </a:defRPr>
+            </a:lvl7pPr>
+            <a:lvl8pPr marL="3429000" indent="-228600" algn="l" defTabSz="914400" rtl="0" eaLnBrk="1" latinLnBrk="0" hangingPunct="1">
+              <a:lnSpc>
+                <a:spcPct val="90000"/>
+              </a:lnSpc>
+              <a:spcBef>
+                <a:spcPts val="500"/>
+              </a:spcBef>
+              <a:buFont typeface="Arial" panose="020B0604020202020204" pitchFamily="34" charset="0"/>
+              <a:buChar char="•"/>
+              <a:defRPr sz="1800" kern="1200">
+                <a:solidFill>
+                  <a:schemeClr val="tx1"/>
+                </a:solidFill>
+                <a:latin typeface="+mn-lt"/>
+                <a:ea typeface="+mn-ea"/>
+                <a:cs typeface="+mn-cs"/>
+              </a:defRPr>
+            </a:lvl8pPr>
+            <a:lvl9pPr marL="3886200" indent="-228600" algn="l" defTabSz="914400" rtl="0" eaLnBrk="1" latinLnBrk="0" hangingPunct="1">
+              <a:lnSpc>
+                <a:spcPct val="90000"/>
+              </a:lnSpc>
+              <a:spcBef>
+                <a:spcPts val="500"/>
+              </a:spcBef>
+              <a:buFont typeface="Arial" panose="020B0604020202020204" pitchFamily="34" charset="0"/>
+              <a:buChar char="•"/>
+              <a:defRPr sz="1800" kern="1200">
+                <a:solidFill>
+                  <a:schemeClr val="tx1"/>
+                </a:solidFill>
+                <a:latin typeface="+mn-lt"/>
+                <a:ea typeface="+mn-ea"/>
+                <a:cs typeface="+mn-cs"/>
+              </a:defRPr>
+            </a:lvl9pPr>
+          </a:lstStyle>
+          <a:p>
+            <a:r>
+              <a:rPr lang="hu-HU" dirty="0"/>
+              <a:t>Adatfeltöltés és import</a:t>
+            </a:r>
+          </a:p>
+          <a:p>
+            <a:r>
+              <a:rPr lang="hu-HU" dirty="0"/>
+              <a:t>Biztonság és hitelesítés</a:t>
+            </a:r>
+          </a:p>
+          <a:p>
+            <a:r>
+              <a:rPr lang="hu-HU" dirty="0"/>
+              <a:t>Tanulók szekrényhozzáférésének szabályozása az órarend alapján</a:t>
+            </a:r>
+          </a:p>
+          <a:p>
+            <a:r>
+              <a:rPr lang="hu-HU" dirty="0"/>
+              <a:t>Csoportszintű és egyéni hozzáférés engedélyezése (pl. nyitás tanítás végén)</a:t>
+            </a:r>
+          </a:p>
+        </p:txBody>
+      </p:sp>
+      <p:sp>
+        <p:nvSpPr>
+          <p:cNvPr id="13" name="Szövegdoboz 12">
+            <a:extLst>
+              <a:ext uri="{FF2B5EF4-FFF2-40B4-BE49-F238E27FC236}">
+                <a16:creationId xmlns:a16="http://schemas.microsoft.com/office/drawing/2014/main" id="{BC151A0F-8858-EA6B-FB49-1AFB517C2CB4}"/>
+              </a:ext>
+            </a:extLst>
+          </p:cNvPr>
+          <p:cNvSpPr txBox="1"/>
+          <p:nvPr/>
+        </p:nvSpPr>
+        <p:spPr>
+          <a:xfrm>
+            <a:off x="6445907" y="506610"/>
+            <a:ext cx="2976328" cy="523220"/>
+          </a:xfrm>
+          <a:prstGeom prst="rect">
+            <a:avLst/>
+          </a:prstGeom>
+          <a:noFill/>
+        </p:spPr>
+        <p:txBody>
+          <a:bodyPr wrap="none" rtlCol="0">
+            <a:spAutoFit/>
+          </a:bodyPr>
+          <a:lstStyle/>
+          <a:p>
+            <a:r>
+              <a:rPr lang="hu-HU" sz="2800" dirty="0">
+                <a:solidFill>
+                  <a:schemeClr val="bg1"/>
+                </a:solidFill>
+              </a:rPr>
+              <a:t>Hardveres funkciók</a:t>
+            </a:r>
+          </a:p>
+        </p:txBody>
+      </p:sp>
+      <p:sp>
+        <p:nvSpPr>
+          <p:cNvPr id="14" name="Szövegdoboz 13">
+            <a:extLst>
+              <a:ext uri="{FF2B5EF4-FFF2-40B4-BE49-F238E27FC236}">
+                <a16:creationId xmlns:a16="http://schemas.microsoft.com/office/drawing/2014/main" id="{7E00BC02-D1A2-492C-35B4-F417CE78B0C0}"/>
+              </a:ext>
+            </a:extLst>
+          </p:cNvPr>
+          <p:cNvSpPr txBox="1"/>
+          <p:nvPr/>
+        </p:nvSpPr>
+        <p:spPr>
+          <a:xfrm>
+            <a:off x="4602097" y="3591538"/>
+            <a:ext cx="2987806" cy="523220"/>
+          </a:xfrm>
+          <a:prstGeom prst="rect">
+            <a:avLst/>
+          </a:prstGeom>
+          <a:noFill/>
+        </p:spPr>
+        <p:txBody>
+          <a:bodyPr wrap="none" rtlCol="0">
+            <a:spAutoFit/>
+          </a:bodyPr>
+          <a:lstStyle/>
+          <a:p>
+            <a:r>
+              <a:rPr lang="hu-HU" sz="2800" dirty="0"/>
+              <a:t>Szoftveres funkciók</a:t>
+            </a:r>
+          </a:p>
+        </p:txBody>
+      </p:sp>
+      <p:sp>
+        <p:nvSpPr>
+          <p:cNvPr id="16" name="Tartalom helye 2">
+            <a:extLst>
+              <a:ext uri="{FF2B5EF4-FFF2-40B4-BE49-F238E27FC236}">
+                <a16:creationId xmlns:a16="http://schemas.microsoft.com/office/drawing/2014/main" id="{79A8284B-F442-04D5-1149-62B4526A670B}"/>
+              </a:ext>
+            </a:extLst>
+          </p:cNvPr>
+          <p:cNvSpPr txBox="1">
+            <a:spLocks/>
+          </p:cNvSpPr>
+          <p:nvPr/>
+        </p:nvSpPr>
+        <p:spPr>
+          <a:xfrm>
+            <a:off x="7153074" y="1139266"/>
+            <a:ext cx="3572805" cy="1550895"/>
+          </a:xfrm>
+          <a:prstGeom prst="rect">
+            <a:avLst/>
+          </a:prstGeom>
+          <a:solidFill>
+            <a:srgbClr val="1758F2"/>
+          </a:solidFill>
+          <a:effectLst/>
+        </p:spPr>
+        <p:txBody>
+          <a:bodyPr vert="horz" lIns="91440" tIns="45720" rIns="91440" bIns="45720" rtlCol="0">
+            <a:normAutofit lnSpcReduction="10000"/>
+          </a:bodyPr>
+          <a:lstStyle>
+            <a:lvl1pPr marL="228600" indent="-228600" algn="l" defTabSz="914400" rtl="0" eaLnBrk="1" latinLnBrk="0" hangingPunct="1">
+              <a:lnSpc>
+                <a:spcPct val="90000"/>
+              </a:lnSpc>
+              <a:spcBef>
+                <a:spcPts val="1000"/>
+              </a:spcBef>
+              <a:buFont typeface="Arial" panose="020B0604020202020204" pitchFamily="34" charset="0"/>
+              <a:buChar char="•"/>
+              <a:defRPr sz="2800" kern="1200">
+                <a:solidFill>
+                  <a:schemeClr val="tx1"/>
+                </a:solidFill>
+                <a:latin typeface="+mn-lt"/>
+                <a:ea typeface="+mn-ea"/>
+                <a:cs typeface="+mn-cs"/>
+              </a:defRPr>
+            </a:lvl1pPr>
+            <a:lvl2pPr marL="685800" indent="-228600" algn="l" defTabSz="914400" rtl="0" eaLnBrk="1" latinLnBrk="0" hangingPunct="1">
+              <a:lnSpc>
+                <a:spcPct val="90000"/>
+              </a:lnSpc>
+              <a:spcBef>
+                <a:spcPts val="500"/>
+              </a:spcBef>
+              <a:buFont typeface="Arial" panose="020B0604020202020204" pitchFamily="34" charset="0"/>
+              <a:buChar char="•"/>
+              <a:defRPr sz="2400" kern="1200">
+                <a:solidFill>
+                  <a:schemeClr val="tx1"/>
+                </a:solidFill>
+                <a:latin typeface="+mn-lt"/>
+                <a:ea typeface="+mn-ea"/>
+                <a:cs typeface="+mn-cs"/>
+              </a:defRPr>
+            </a:lvl2pPr>
+            <a:lvl3pPr marL="1143000" indent="-228600" algn="l" defTabSz="914400" rtl="0" eaLnBrk="1" latinLnBrk="0" hangingPunct="1">
+              <a:lnSpc>
+                <a:spcPct val="90000"/>
+              </a:lnSpc>
+              <a:spcBef>
+                <a:spcPts val="500"/>
+              </a:spcBef>
+              <a:buFont typeface="Arial" panose="020B0604020202020204" pitchFamily="34" charset="0"/>
+              <a:buChar char="•"/>
+              <a:defRPr sz="2000" kern="1200">
+                <a:solidFill>
+                  <a:schemeClr val="tx1"/>
+                </a:solidFill>
+                <a:latin typeface="+mn-lt"/>
+                <a:ea typeface="+mn-ea"/>
+                <a:cs typeface="+mn-cs"/>
+              </a:defRPr>
+            </a:lvl3pPr>
+            <a:lvl4pPr marL="1600200" indent="-228600" algn="l" defTabSz="914400" rtl="0" eaLnBrk="1" latinLnBrk="0" hangingPunct="1">
+              <a:lnSpc>
+                <a:spcPct val="90000"/>
+              </a:lnSpc>
+              <a:spcBef>
+                <a:spcPts val="500"/>
+              </a:spcBef>
+              <a:buFont typeface="Arial" panose="020B0604020202020204" pitchFamily="34" charset="0"/>
+              <a:buChar char="•"/>
+              <a:defRPr sz="1800" kern="1200">
+                <a:solidFill>
+                  <a:schemeClr val="tx1"/>
+                </a:solidFill>
+                <a:latin typeface="+mn-lt"/>
+                <a:ea typeface="+mn-ea"/>
+                <a:cs typeface="+mn-cs"/>
+              </a:defRPr>
+            </a:lvl4pPr>
+            <a:lvl5pPr marL="2057400" indent="-228600" algn="l" defTabSz="914400" rtl="0" eaLnBrk="1" latinLnBrk="0" hangingPunct="1">
+              <a:lnSpc>
+                <a:spcPct val="90000"/>
+              </a:lnSpc>
+              <a:spcBef>
+                <a:spcPts val="500"/>
+              </a:spcBef>
+              <a:buFont typeface="Arial" panose="020B0604020202020204" pitchFamily="34" charset="0"/>
+              <a:buChar char="•"/>
+              <a:defRPr sz="1800" kern="1200">
+                <a:solidFill>
+                  <a:schemeClr val="tx1"/>
+                </a:solidFill>
+                <a:latin typeface="+mn-lt"/>
+                <a:ea typeface="+mn-ea"/>
+                <a:cs typeface="+mn-cs"/>
+              </a:defRPr>
+            </a:lvl5pPr>
+            <a:lvl6pPr marL="2514600" indent="-228600" algn="l" defTabSz="914400" rtl="0" eaLnBrk="1" latinLnBrk="0" hangingPunct="1">
+              <a:lnSpc>
+                <a:spcPct val="90000"/>
+              </a:lnSpc>
+              <a:spcBef>
+                <a:spcPts val="500"/>
+              </a:spcBef>
+              <a:buFont typeface="Arial" panose="020B0604020202020204" pitchFamily="34" charset="0"/>
+              <a:buChar char="•"/>
+              <a:defRPr sz="1800" kern="1200">
+                <a:solidFill>
+                  <a:schemeClr val="tx1"/>
+                </a:solidFill>
+                <a:latin typeface="+mn-lt"/>
+                <a:ea typeface="+mn-ea"/>
+                <a:cs typeface="+mn-cs"/>
+              </a:defRPr>
+            </a:lvl6pPr>
+            <a:lvl7pPr marL="2971800" indent="-228600" algn="l" defTabSz="914400" rtl="0" eaLnBrk="1" latinLnBrk="0" hangingPunct="1">
+              <a:lnSpc>
+                <a:spcPct val="90000"/>
+              </a:lnSpc>
+              <a:spcBef>
+                <a:spcPts val="500"/>
+              </a:spcBef>
+              <a:buFont typeface="Arial" panose="020B0604020202020204" pitchFamily="34" charset="0"/>
+              <a:buChar char="•"/>
+              <a:defRPr sz="1800" kern="1200">
+                <a:solidFill>
+                  <a:schemeClr val="tx1"/>
+                </a:solidFill>
+                <a:latin typeface="+mn-lt"/>
+                <a:ea typeface="+mn-ea"/>
+                <a:cs typeface="+mn-cs"/>
+              </a:defRPr>
+            </a:lvl7pPr>
+            <a:lvl8pPr marL="3429000" indent="-228600" algn="l" defTabSz="914400" rtl="0" eaLnBrk="1" latinLnBrk="0" hangingPunct="1">
+              <a:lnSpc>
+                <a:spcPct val="90000"/>
+              </a:lnSpc>
+              <a:spcBef>
+                <a:spcPts val="500"/>
+              </a:spcBef>
+              <a:buFont typeface="Arial" panose="020B0604020202020204" pitchFamily="34" charset="0"/>
+              <a:buChar char="•"/>
+              <a:defRPr sz="1800" kern="1200">
+                <a:solidFill>
+                  <a:schemeClr val="tx1"/>
+                </a:solidFill>
+                <a:latin typeface="+mn-lt"/>
+                <a:ea typeface="+mn-ea"/>
+                <a:cs typeface="+mn-cs"/>
+              </a:defRPr>
+            </a:lvl8pPr>
+            <a:lvl9pPr marL="3886200" indent="-228600" algn="l" defTabSz="914400" rtl="0" eaLnBrk="1" latinLnBrk="0" hangingPunct="1">
+              <a:lnSpc>
+                <a:spcPct val="90000"/>
+              </a:lnSpc>
+              <a:spcBef>
+                <a:spcPts val="500"/>
+              </a:spcBef>
+              <a:buFont typeface="Arial" panose="020B0604020202020204" pitchFamily="34" charset="0"/>
+              <a:buChar char="•"/>
+              <a:defRPr sz="1800" kern="1200">
+                <a:solidFill>
+                  <a:schemeClr val="tx1"/>
+                </a:solidFill>
+                <a:latin typeface="+mn-lt"/>
+                <a:ea typeface="+mn-ea"/>
+                <a:cs typeface="+mn-cs"/>
+              </a:defRPr>
+            </a:lvl9pPr>
+          </a:lstStyle>
+          <a:p>
+            <a:r>
+              <a:rPr lang="hu-HU" sz="2000" dirty="0">
+                <a:solidFill>
+                  <a:schemeClr val="bg1"/>
+                </a:solidFill>
+              </a:rPr>
+              <a:t>RFID-alapú azonosítás</a:t>
+            </a:r>
+          </a:p>
+          <a:p>
+            <a:r>
+              <a:rPr lang="hu-HU" sz="2000" dirty="0">
+                <a:solidFill>
+                  <a:schemeClr val="bg1"/>
+                </a:solidFill>
+              </a:rPr>
+              <a:t>Mikrokontrolleres vezérlés</a:t>
+            </a:r>
+          </a:p>
+          <a:p>
+            <a:r>
+              <a:rPr lang="hu-HU" sz="2000" dirty="0">
+                <a:solidFill>
+                  <a:schemeClr val="bg1"/>
+                </a:solidFill>
+              </a:rPr>
+              <a:t>Ethernet-alapú kommunikáció</a:t>
+            </a:r>
+          </a:p>
+          <a:p>
+            <a:r>
+              <a:rPr lang="hu-HU" sz="2000" dirty="0">
+                <a:solidFill>
+                  <a:schemeClr val="bg1"/>
+                </a:solidFill>
+              </a:rPr>
+              <a:t>Tárolók automatikus kezelése</a:t>
+            </a:r>
           </a:p>
         </p:txBody>
       </p:sp>
@@ -4923,6 +5878,14 @@
 <file path=ppt/slides/slide4.xml><?xml version="1.0" encoding="utf-8"?>
 <p:sld xmlns:a="http://schemas.openxmlformats.org/drawingml/2006/main" xmlns:r="http://schemas.openxmlformats.org/officeDocument/2006/relationships" xmlns:p="http://schemas.openxmlformats.org/presentationml/2006/main">
   <p:cSld>
+    <p:bg>
+      <p:bgPr>
+        <a:solidFill>
+          <a:srgbClr val="1758F2"/>
+        </a:solidFill>
+        <a:effectLst/>
+      </p:bgPr>
+    </p:bg>
     <p:spTree>
       <p:nvGrpSpPr>
         <p:cNvPr id="1" name=""/>
@@ -4939,6 +5902,55 @@
       </p:grpSpPr>
       <p:sp>
         <p:nvSpPr>
+          <p:cNvPr id="10" name="Téglalap 9">
+            <a:extLst>
+              <a:ext uri="{FF2B5EF4-FFF2-40B4-BE49-F238E27FC236}">
+                <a16:creationId xmlns:a16="http://schemas.microsoft.com/office/drawing/2014/main" id="{389E5F50-6D42-6AB4-1B5C-2B925455289B}"/>
+              </a:ext>
+            </a:extLst>
+          </p:cNvPr>
+          <p:cNvSpPr/>
+          <p:nvPr/>
+        </p:nvSpPr>
+        <p:spPr>
+          <a:xfrm>
+            <a:off x="6096000" y="0"/>
+            <a:ext cx="6096000" cy="6858000"/>
+          </a:xfrm>
+          <a:prstGeom prst="rect">
+            <a:avLst/>
+          </a:prstGeom>
+          <a:solidFill>
+            <a:schemeClr val="bg1"/>
+          </a:solidFill>
+        </p:spPr>
+        <p:style>
+          <a:lnRef idx="2">
+            <a:schemeClr val="accent1">
+              <a:shade val="15000"/>
+            </a:schemeClr>
+          </a:lnRef>
+          <a:fillRef idx="1">
+            <a:schemeClr val="accent1"/>
+          </a:fillRef>
+          <a:effectRef idx="0">
+            <a:schemeClr val="accent1"/>
+          </a:effectRef>
+          <a:fontRef idx="minor">
+            <a:schemeClr val="lt1"/>
+          </a:fontRef>
+        </p:style>
+        <p:txBody>
+          <a:bodyPr rtlCol="0" anchor="ctr"/>
+          <a:lstStyle/>
+          <a:p>
+            <a:pPr algn="ctr"/>
+            <a:endParaRPr lang="hu-HU"/>
+          </a:p>
+        </p:txBody>
+      </p:sp>
+      <p:sp>
+        <p:nvSpPr>
           <p:cNvPr id="2" name="Cím 1">
             <a:extLst>
               <a:ext uri="{FF2B5EF4-FFF2-40B4-BE49-F238E27FC236}">
@@ -4953,40 +5965,480 @@
             <p:ph type="title"/>
           </p:nvPr>
         </p:nvSpPr>
-        <p:spPr/>
+        <p:spPr>
+          <a:xfrm>
+            <a:off x="838200" y="365125"/>
+            <a:ext cx="2206557" cy="1325563"/>
+          </a:xfrm>
+        </p:spPr>
         <p:txBody>
           <a:bodyPr/>
           <a:lstStyle/>
           <a:p>
             <a:r>
+              <a:rPr lang="hu-HU" dirty="0">
+                <a:solidFill>
+                  <a:schemeClr val="bg1"/>
+                </a:solidFill>
+              </a:rPr>
+              <a:t>Hardver</a:t>
+            </a:r>
+          </a:p>
+        </p:txBody>
+      </p:sp>
+      <p:sp>
+        <p:nvSpPr>
+          <p:cNvPr id="3" name="Tartalom helye 2">
+            <a:extLst>
+              <a:ext uri="{FF2B5EF4-FFF2-40B4-BE49-F238E27FC236}">
+                <a16:creationId xmlns:a16="http://schemas.microsoft.com/office/drawing/2014/main" id="{7B3B9083-177B-400D-B26D-7F5532D993B3}"/>
+              </a:ext>
+            </a:extLst>
+          </p:cNvPr>
+          <p:cNvSpPr>
+            <a:spLocks noGrp="1"/>
+          </p:cNvSpPr>
+          <p:nvPr>
+            <p:ph idx="1"/>
+          </p:nvPr>
+        </p:nvSpPr>
+        <p:spPr>
+          <a:xfrm>
+            <a:off x="6778558" y="1729380"/>
+            <a:ext cx="5157280" cy="4351338"/>
+          </a:xfrm>
+        </p:spPr>
+        <p:txBody>
+          <a:bodyPr>
+            <a:normAutofit/>
+          </a:bodyPr>
+          <a:lstStyle/>
+          <a:p>
+            <a:r>
+              <a:rPr lang="hu-HU" sz="2000" dirty="0"/>
+              <a:t>1 db elektronikai rekesz</a:t>
+            </a:r>
+          </a:p>
+          <a:p>
+            <a:pPr lvl="1"/>
+            <a:r>
+              <a:rPr lang="hu-HU" sz="2000" dirty="0"/>
+              <a:t>Tartalmazza az </a:t>
+            </a:r>
+            <a:r>
+              <a:rPr lang="hu-HU" sz="2000" dirty="0" err="1"/>
+              <a:t>Arduino</a:t>
+            </a:r>
+            <a:r>
+              <a:rPr lang="hu-HU" sz="2000" dirty="0"/>
+              <a:t>-t, reléket, tápot és vezetékezést</a:t>
+            </a:r>
+          </a:p>
+          <a:p>
+            <a:r>
+              <a:rPr lang="hu-HU" sz="2000" dirty="0"/>
+              <a:t>2 db telefonrekesz</a:t>
+            </a:r>
+          </a:p>
+          <a:p>
+            <a:pPr lvl="1"/>
+            <a:r>
+              <a:rPr lang="hu-HU" sz="2000" dirty="0"/>
+              <a:t>Szabványos méret a mobiltelefonok biztonságos tárolására</a:t>
+            </a:r>
+          </a:p>
+          <a:p>
+            <a:pPr lvl="1"/>
+            <a:r>
+              <a:rPr lang="hu-HU" sz="2000" dirty="0"/>
+              <a:t>Minden rekesz külön </a:t>
+            </a:r>
+            <a:r>
+              <a:rPr lang="hu-HU" sz="2000" dirty="0" err="1"/>
+              <a:t>szolenoid</a:t>
+            </a:r>
+            <a:r>
+              <a:rPr lang="hu-HU" sz="2000" dirty="0"/>
+              <a:t> zárral rendelkezik</a:t>
+            </a:r>
+          </a:p>
+          <a:p>
+            <a:pPr lvl="1"/>
+            <a:r>
+              <a:rPr lang="hu-HU" sz="2000" dirty="0"/>
+              <a:t>Nyitás/zárás RFID azonosítás és szerverengedély alapján</a:t>
+            </a:r>
+          </a:p>
+        </p:txBody>
+      </p:sp>
+      <p:sp>
+        <p:nvSpPr>
+          <p:cNvPr id="8" name="Cím 1">
+            <a:extLst>
+              <a:ext uri="{FF2B5EF4-FFF2-40B4-BE49-F238E27FC236}">
+                <a16:creationId xmlns:a16="http://schemas.microsoft.com/office/drawing/2014/main" id="{89C53918-2F79-8184-BF5A-88BB2A7A51C2}"/>
+              </a:ext>
+            </a:extLst>
+          </p:cNvPr>
+          <p:cNvSpPr txBox="1">
+            <a:spLocks/>
+          </p:cNvSpPr>
+          <p:nvPr/>
+        </p:nvSpPr>
+        <p:spPr>
+          <a:xfrm>
+            <a:off x="6778558" y="365124"/>
+            <a:ext cx="3279842" cy="1325563"/>
+          </a:xfrm>
+          <a:prstGeom prst="rect">
+            <a:avLst/>
+          </a:prstGeom>
+        </p:spPr>
+        <p:txBody>
+          <a:bodyPr vert="horz" lIns="91440" tIns="45720" rIns="91440" bIns="45720" rtlCol="0" anchor="ctr">
+            <a:normAutofit/>
+          </a:bodyPr>
+          <a:lstStyle>
+            <a:lvl1pPr algn="l" defTabSz="914400" rtl="0" eaLnBrk="1" latinLnBrk="0" hangingPunct="1">
+              <a:lnSpc>
+                <a:spcPct val="90000"/>
+              </a:lnSpc>
+              <a:spcBef>
+                <a:spcPct val="0"/>
+              </a:spcBef>
+              <a:buNone/>
+              <a:defRPr sz="4400" kern="1200">
+                <a:solidFill>
+                  <a:schemeClr val="tx1"/>
+                </a:solidFill>
+                <a:latin typeface="+mj-lt"/>
+                <a:ea typeface="+mj-ea"/>
+                <a:cs typeface="+mj-cs"/>
+              </a:defRPr>
+            </a:lvl1pPr>
+          </a:lstStyle>
+          <a:p>
+            <a:r>
               <a:rPr lang="hu-HU" dirty="0"/>
-              <a:t>Hardver</a:t>
-            </a:r>
-          </a:p>
-        </p:txBody>
-      </p:sp>
-      <p:sp>
-        <p:nvSpPr>
-          <p:cNvPr id="3" name="Tartalom helye 2">
-            <a:extLst>
-              <a:ext uri="{FF2B5EF4-FFF2-40B4-BE49-F238E27FC236}">
-                <a16:creationId xmlns:a16="http://schemas.microsoft.com/office/drawing/2014/main" id="{7B3B9083-177B-400D-B26D-7F5532D993B3}"/>
-              </a:ext>
-            </a:extLst>
-          </p:cNvPr>
-          <p:cNvSpPr>
-            <a:spLocks noGrp="1"/>
-          </p:cNvSpPr>
-          <p:nvPr>
-            <p:ph idx="1"/>
-          </p:nvPr>
-        </p:nvSpPr>
-        <p:spPr/>
-        <p:txBody>
-          <a:bodyPr/>
-          <a:lstStyle/>
-          <a:p>
-            <a:endParaRPr lang="hu-HU"/>
+              <a:t>Fizikai tárolók</a:t>
+            </a:r>
+          </a:p>
+        </p:txBody>
+      </p:sp>
+      <p:sp>
+        <p:nvSpPr>
+          <p:cNvPr id="9" name="Tartalom helye 2">
+            <a:extLst>
+              <a:ext uri="{FF2B5EF4-FFF2-40B4-BE49-F238E27FC236}">
+                <a16:creationId xmlns:a16="http://schemas.microsoft.com/office/drawing/2014/main" id="{2156CBFB-8B2D-871E-7950-608907C748EC}"/>
+              </a:ext>
+            </a:extLst>
+          </p:cNvPr>
+          <p:cNvSpPr txBox="1">
+            <a:spLocks/>
+          </p:cNvSpPr>
+          <p:nvPr/>
+        </p:nvSpPr>
+        <p:spPr>
+          <a:xfrm>
+            <a:off x="838200" y="1729380"/>
+            <a:ext cx="4998396" cy="4351338"/>
+          </a:xfrm>
+          <a:prstGeom prst="rect">
+            <a:avLst/>
+          </a:prstGeom>
+        </p:spPr>
+        <p:txBody>
+          <a:bodyPr vert="horz" lIns="91440" tIns="45720" rIns="91440" bIns="45720" rtlCol="0">
+            <a:noAutofit/>
+          </a:bodyPr>
+          <a:lstStyle>
+            <a:lvl1pPr marL="228600" indent="-228600" algn="l" defTabSz="914400" rtl="0" eaLnBrk="1" latinLnBrk="0" hangingPunct="1">
+              <a:lnSpc>
+                <a:spcPct val="90000"/>
+              </a:lnSpc>
+              <a:spcBef>
+                <a:spcPts val="1000"/>
+              </a:spcBef>
+              <a:buFont typeface="Arial" panose="020B0604020202020204" pitchFamily="34" charset="0"/>
+              <a:buChar char="•"/>
+              <a:defRPr sz="2800" kern="1200">
+                <a:solidFill>
+                  <a:schemeClr val="tx1"/>
+                </a:solidFill>
+                <a:latin typeface="+mn-lt"/>
+                <a:ea typeface="+mn-ea"/>
+                <a:cs typeface="+mn-cs"/>
+              </a:defRPr>
+            </a:lvl1pPr>
+            <a:lvl2pPr marL="685800" indent="-228600" algn="l" defTabSz="914400" rtl="0" eaLnBrk="1" latinLnBrk="0" hangingPunct="1">
+              <a:lnSpc>
+                <a:spcPct val="90000"/>
+              </a:lnSpc>
+              <a:spcBef>
+                <a:spcPts val="500"/>
+              </a:spcBef>
+              <a:buFont typeface="Arial" panose="020B0604020202020204" pitchFamily="34" charset="0"/>
+              <a:buChar char="•"/>
+              <a:defRPr sz="2400" kern="1200">
+                <a:solidFill>
+                  <a:schemeClr val="tx1"/>
+                </a:solidFill>
+                <a:latin typeface="+mn-lt"/>
+                <a:ea typeface="+mn-ea"/>
+                <a:cs typeface="+mn-cs"/>
+              </a:defRPr>
+            </a:lvl2pPr>
+            <a:lvl3pPr marL="1143000" indent="-228600" algn="l" defTabSz="914400" rtl="0" eaLnBrk="1" latinLnBrk="0" hangingPunct="1">
+              <a:lnSpc>
+                <a:spcPct val="90000"/>
+              </a:lnSpc>
+              <a:spcBef>
+                <a:spcPts val="500"/>
+              </a:spcBef>
+              <a:buFont typeface="Arial" panose="020B0604020202020204" pitchFamily="34" charset="0"/>
+              <a:buChar char="•"/>
+              <a:defRPr sz="2000" kern="1200">
+                <a:solidFill>
+                  <a:schemeClr val="tx1"/>
+                </a:solidFill>
+                <a:latin typeface="+mn-lt"/>
+                <a:ea typeface="+mn-ea"/>
+                <a:cs typeface="+mn-cs"/>
+              </a:defRPr>
+            </a:lvl3pPr>
+            <a:lvl4pPr marL="1600200" indent="-228600" algn="l" defTabSz="914400" rtl="0" eaLnBrk="1" latinLnBrk="0" hangingPunct="1">
+              <a:lnSpc>
+                <a:spcPct val="90000"/>
+              </a:lnSpc>
+              <a:spcBef>
+                <a:spcPts val="500"/>
+              </a:spcBef>
+              <a:buFont typeface="Arial" panose="020B0604020202020204" pitchFamily="34" charset="0"/>
+              <a:buChar char="•"/>
+              <a:defRPr sz="1800" kern="1200">
+                <a:solidFill>
+                  <a:schemeClr val="tx1"/>
+                </a:solidFill>
+                <a:latin typeface="+mn-lt"/>
+                <a:ea typeface="+mn-ea"/>
+                <a:cs typeface="+mn-cs"/>
+              </a:defRPr>
+            </a:lvl4pPr>
+            <a:lvl5pPr marL="2057400" indent="-228600" algn="l" defTabSz="914400" rtl="0" eaLnBrk="1" latinLnBrk="0" hangingPunct="1">
+              <a:lnSpc>
+                <a:spcPct val="90000"/>
+              </a:lnSpc>
+              <a:spcBef>
+                <a:spcPts val="500"/>
+              </a:spcBef>
+              <a:buFont typeface="Arial" panose="020B0604020202020204" pitchFamily="34" charset="0"/>
+              <a:buChar char="•"/>
+              <a:defRPr sz="1800" kern="1200">
+                <a:solidFill>
+                  <a:schemeClr val="tx1"/>
+                </a:solidFill>
+                <a:latin typeface="+mn-lt"/>
+                <a:ea typeface="+mn-ea"/>
+                <a:cs typeface="+mn-cs"/>
+              </a:defRPr>
+            </a:lvl5pPr>
+            <a:lvl6pPr marL="2514600" indent="-228600" algn="l" defTabSz="914400" rtl="0" eaLnBrk="1" latinLnBrk="0" hangingPunct="1">
+              <a:lnSpc>
+                <a:spcPct val="90000"/>
+              </a:lnSpc>
+              <a:spcBef>
+                <a:spcPts val="500"/>
+              </a:spcBef>
+              <a:buFont typeface="Arial" panose="020B0604020202020204" pitchFamily="34" charset="0"/>
+              <a:buChar char="•"/>
+              <a:defRPr sz="1800" kern="1200">
+                <a:solidFill>
+                  <a:schemeClr val="tx1"/>
+                </a:solidFill>
+                <a:latin typeface="+mn-lt"/>
+                <a:ea typeface="+mn-ea"/>
+                <a:cs typeface="+mn-cs"/>
+              </a:defRPr>
+            </a:lvl6pPr>
+            <a:lvl7pPr marL="2971800" indent="-228600" algn="l" defTabSz="914400" rtl="0" eaLnBrk="1" latinLnBrk="0" hangingPunct="1">
+              <a:lnSpc>
+                <a:spcPct val="90000"/>
+              </a:lnSpc>
+              <a:spcBef>
+                <a:spcPts val="500"/>
+              </a:spcBef>
+              <a:buFont typeface="Arial" panose="020B0604020202020204" pitchFamily="34" charset="0"/>
+              <a:buChar char="•"/>
+              <a:defRPr sz="1800" kern="1200">
+                <a:solidFill>
+                  <a:schemeClr val="tx1"/>
+                </a:solidFill>
+                <a:latin typeface="+mn-lt"/>
+                <a:ea typeface="+mn-ea"/>
+                <a:cs typeface="+mn-cs"/>
+              </a:defRPr>
+            </a:lvl7pPr>
+            <a:lvl8pPr marL="3429000" indent="-228600" algn="l" defTabSz="914400" rtl="0" eaLnBrk="1" latinLnBrk="0" hangingPunct="1">
+              <a:lnSpc>
+                <a:spcPct val="90000"/>
+              </a:lnSpc>
+              <a:spcBef>
+                <a:spcPts val="500"/>
+              </a:spcBef>
+              <a:buFont typeface="Arial" panose="020B0604020202020204" pitchFamily="34" charset="0"/>
+              <a:buChar char="•"/>
+              <a:defRPr sz="1800" kern="1200">
+                <a:solidFill>
+                  <a:schemeClr val="tx1"/>
+                </a:solidFill>
+                <a:latin typeface="+mn-lt"/>
+                <a:ea typeface="+mn-ea"/>
+                <a:cs typeface="+mn-cs"/>
+              </a:defRPr>
+            </a:lvl8pPr>
+            <a:lvl9pPr marL="3886200" indent="-228600" algn="l" defTabSz="914400" rtl="0" eaLnBrk="1" latinLnBrk="0" hangingPunct="1">
+              <a:lnSpc>
+                <a:spcPct val="90000"/>
+              </a:lnSpc>
+              <a:spcBef>
+                <a:spcPts val="500"/>
+              </a:spcBef>
+              <a:buFont typeface="Arial" panose="020B0604020202020204" pitchFamily="34" charset="0"/>
+              <a:buChar char="•"/>
+              <a:defRPr sz="1800" kern="1200">
+                <a:solidFill>
+                  <a:schemeClr val="tx1"/>
+                </a:solidFill>
+                <a:latin typeface="+mn-lt"/>
+                <a:ea typeface="+mn-ea"/>
+                <a:cs typeface="+mn-cs"/>
+              </a:defRPr>
+            </a:lvl9pPr>
+          </a:lstStyle>
+          <a:p>
+            <a:r>
+              <a:rPr lang="hu-HU" sz="2000" dirty="0" err="1">
+                <a:solidFill>
+                  <a:schemeClr val="bg1"/>
+                </a:solidFill>
+              </a:rPr>
+              <a:t>Arduino</a:t>
+            </a:r>
+            <a:r>
+              <a:rPr lang="hu-HU" sz="2000" dirty="0">
+                <a:solidFill>
+                  <a:schemeClr val="bg1"/>
+                </a:solidFill>
+              </a:rPr>
+              <a:t> </a:t>
+            </a:r>
+            <a:r>
+              <a:rPr lang="hu-HU" sz="2000" dirty="0" err="1">
+                <a:solidFill>
+                  <a:schemeClr val="bg1"/>
+                </a:solidFill>
+              </a:rPr>
+              <a:t>Uno</a:t>
+            </a:r>
+            <a:r>
+              <a:rPr lang="hu-HU" sz="2000" dirty="0">
+                <a:solidFill>
+                  <a:schemeClr val="bg1"/>
+                </a:solidFill>
+              </a:rPr>
+              <a:t> – központi vezérlőegység</a:t>
+            </a:r>
+          </a:p>
+          <a:p>
+            <a:r>
+              <a:rPr lang="hu-HU" sz="2000" dirty="0">
+                <a:solidFill>
+                  <a:schemeClr val="bg1"/>
+                </a:solidFill>
+              </a:rPr>
+              <a:t>RFID olvasó – tanulói azonosításhoz</a:t>
+            </a:r>
+          </a:p>
+          <a:p>
+            <a:r>
+              <a:rPr lang="hu-HU" sz="2000" dirty="0" err="1">
+                <a:solidFill>
+                  <a:schemeClr val="bg1"/>
+                </a:solidFill>
+              </a:rPr>
+              <a:t>Szolenoid</a:t>
+            </a:r>
+            <a:r>
+              <a:rPr lang="hu-HU" sz="2000" dirty="0">
+                <a:solidFill>
+                  <a:schemeClr val="bg1"/>
+                </a:solidFill>
+              </a:rPr>
+              <a:t> </a:t>
+            </a:r>
+            <a:r>
+              <a:rPr lang="hu-HU" sz="2000" dirty="0" err="1">
+                <a:solidFill>
+                  <a:schemeClr val="bg1"/>
+                </a:solidFill>
+              </a:rPr>
+              <a:t>zárak</a:t>
+            </a:r>
+            <a:r>
+              <a:rPr lang="hu-HU" sz="2000" dirty="0">
+                <a:solidFill>
+                  <a:schemeClr val="bg1"/>
+                </a:solidFill>
+              </a:rPr>
+              <a:t> – a telefonrekeszek fizikai nyitásához/zárásához</a:t>
+            </a:r>
+          </a:p>
+          <a:p>
+            <a:r>
+              <a:rPr lang="hu-HU" sz="2000" dirty="0">
+                <a:solidFill>
+                  <a:schemeClr val="bg1"/>
+                </a:solidFill>
+              </a:rPr>
+              <a:t>Tápegység – biztosítja a működéshez szükséges feszültséget</a:t>
+            </a:r>
+          </a:p>
+          <a:p>
+            <a:r>
+              <a:rPr lang="hu-HU" sz="2000" dirty="0">
+                <a:solidFill>
+                  <a:schemeClr val="bg1"/>
+                </a:solidFill>
+              </a:rPr>
+              <a:t>Ethernet modul/</a:t>
+            </a:r>
+            <a:r>
+              <a:rPr lang="hu-HU" sz="2000" dirty="0" err="1">
+                <a:solidFill>
+                  <a:schemeClr val="bg1"/>
+                </a:solidFill>
+              </a:rPr>
+              <a:t>shield</a:t>
+            </a:r>
+            <a:r>
+              <a:rPr lang="hu-HU" sz="2000" dirty="0">
+                <a:solidFill>
+                  <a:schemeClr val="bg1"/>
+                </a:solidFill>
+              </a:rPr>
+              <a:t> – hálózati kommunikációhoz</a:t>
+            </a:r>
+          </a:p>
+          <a:p>
+            <a:r>
+              <a:rPr lang="hu-HU" sz="2000" dirty="0">
+                <a:solidFill>
+                  <a:schemeClr val="bg1"/>
+                </a:solidFill>
+              </a:rPr>
+              <a:t>RFID kártyák/biléták – tanulói hozzáféréshez</a:t>
+            </a:r>
           </a:p>
         </p:txBody>
       </p:sp>
@@ -5006,6 +6458,14 @@
 <file path=ppt/slides/slide5.xml><?xml version="1.0" encoding="utf-8"?>
 <p:sld xmlns:a="http://schemas.openxmlformats.org/drawingml/2006/main" xmlns:r="http://schemas.openxmlformats.org/officeDocument/2006/relationships" xmlns:p="http://schemas.openxmlformats.org/presentationml/2006/main">
   <p:cSld>
+    <p:bg>
+      <p:bgPr>
+        <a:solidFill>
+          <a:srgbClr val="EFF6FF"/>
+        </a:solidFill>
+        <a:effectLst/>
+      </p:bgPr>
+    </p:bg>
     <p:spTree>
       <p:nvGrpSpPr>
         <p:cNvPr id="1" name=""/>
@@ -5036,13 +6496,25 @@
             <p:ph type="title"/>
           </p:nvPr>
         </p:nvSpPr>
-        <p:spPr/>
+        <p:spPr>
+          <a:xfrm>
+            <a:off x="4783576" y="423491"/>
+            <a:ext cx="2119009" cy="1325563"/>
+          </a:xfrm>
+          <a:solidFill>
+            <a:srgbClr val="EFF6FF"/>
+          </a:solidFill>
+        </p:spPr>
         <p:txBody>
           <a:bodyPr/>
           <a:lstStyle/>
           <a:p>
             <a:r>
-              <a:rPr lang="hu-HU" dirty="0"/>
+              <a:rPr lang="hu-HU" dirty="0">
+                <a:solidFill>
+                  <a:srgbClr val="145CFC"/>
+                </a:solidFill>
+              </a:rPr>
               <a:t>Szoftver</a:t>
             </a:r>
           </a:p>
@@ -5064,9 +6536,19 @@
             <p:ph idx="1"/>
           </p:nvPr>
         </p:nvSpPr>
-        <p:spPr/>
-        <p:txBody>
-          <a:bodyPr/>
+        <p:spPr>
+          <a:xfrm>
+            <a:off x="3910923" y="2273096"/>
+            <a:ext cx="4370151" cy="4079065"/>
+          </a:xfrm>
+          <a:solidFill>
+            <a:srgbClr val="EFF6FF"/>
+          </a:solidFill>
+        </p:spPr>
+        <p:txBody>
+          <a:bodyPr>
+            <a:normAutofit/>
+          </a:bodyPr>
           <a:lstStyle/>
           <a:p>
             <a:r>
@@ -5075,10 +6557,71 @@
             </a:r>
           </a:p>
           <a:p>
+            <a:pPr lvl="1"/>
+            <a:r>
+              <a:rPr lang="hu-HU" dirty="0" err="1"/>
+              <a:t>Swagger</a:t>
+            </a:r>
             <a:r>
               <a:rPr lang="hu-HU" dirty="0"/>
-              <a:t>Frontend – Next.js</a:t>
-            </a:r>
+              <a:t> (</a:t>
+            </a:r>
+            <a:r>
+              <a:rPr lang="hu-HU" dirty="0" err="1"/>
+              <a:t>OpenAPI</a:t>
+            </a:r>
+            <a:r>
+              <a:rPr lang="hu-HU" dirty="0"/>
+              <a:t>)</a:t>
+            </a:r>
+          </a:p>
+          <a:p>
+            <a:pPr lvl="1"/>
+            <a:r>
+              <a:rPr lang="hu-HU" dirty="0"/>
+              <a:t>NextAuth.js</a:t>
+            </a:r>
+          </a:p>
+          <a:p>
+            <a:r>
+              <a:rPr lang="hu-HU" dirty="0"/>
+              <a:t>Frontend – Next.js (</a:t>
+            </a:r>
+            <a:r>
+              <a:rPr lang="hu-HU" dirty="0" err="1"/>
+              <a:t>React</a:t>
+            </a:r>
+            <a:r>
+              <a:rPr lang="hu-HU" dirty="0"/>
+              <a:t>)</a:t>
+            </a:r>
+          </a:p>
+          <a:p>
+            <a:pPr lvl="1"/>
+            <a:r>
+              <a:rPr lang="hu-HU" dirty="0" err="1"/>
+              <a:t>Tailwind</a:t>
+            </a:r>
+            <a:r>
+              <a:rPr lang="hu-HU" dirty="0"/>
+              <a:t> CSS</a:t>
+            </a:r>
+          </a:p>
+          <a:p>
+            <a:pPr lvl="1"/>
+            <a:r>
+              <a:rPr lang="hu-HU" dirty="0" err="1"/>
+              <a:t>Shadcn</a:t>
+            </a:r>
+            <a:r>
+              <a:rPr lang="hu-HU" dirty="0"/>
+              <a:t>/</a:t>
+            </a:r>
+            <a:r>
+              <a:rPr lang="hu-HU" dirty="0" err="1"/>
+              <a:t>ui</a:t>
+            </a:r>
+            <a:endParaRPr lang="hu-HU" dirty="0"/>
           </a:p>
           <a:p>
             <a:r>
@@ -5090,6 +6633,23 @@
               <a:t>PostgreSQL</a:t>
             </a:r>
             <a:endParaRPr lang="hu-HU" dirty="0"/>
+          </a:p>
+          <a:p>
+            <a:pPr lvl="1"/>
+            <a:r>
+              <a:rPr lang="hu-HU" dirty="0"/>
+              <a:t>Neon</a:t>
+            </a:r>
+          </a:p>
+          <a:p>
+            <a:r>
+              <a:rPr lang="hu-HU" dirty="0" err="1"/>
+              <a:t>Arduino</a:t>
+            </a:r>
+            <a:r>
+              <a:rPr lang="hu-HU" dirty="0"/>
+              <a:t> IDE</a:t>
+            </a:r>
           </a:p>
         </p:txBody>
       </p:sp>
@@ -5167,12 +6727,76 @@
             <p:ph idx="1"/>
           </p:nvPr>
         </p:nvSpPr>
-        <p:spPr/>
+        <p:spPr>
+          <a:xfrm>
+            <a:off x="838200" y="1825625"/>
+            <a:ext cx="4113179" cy="4351338"/>
+          </a:xfrm>
+        </p:spPr>
         <p:txBody>
           <a:bodyPr/>
           <a:lstStyle/>
           <a:p>
-            <a:endParaRPr lang="hu-HU"/>
+            <a:r>
+              <a:rPr lang="hu-HU" dirty="0"/>
+              <a:t>Next.js (Node.js)</a:t>
+            </a:r>
+          </a:p>
+          <a:p>
+            <a:r>
+              <a:rPr lang="hu-HU" dirty="0"/>
+              <a:t>HTTP/HTTPS API végpontok</a:t>
+            </a:r>
+          </a:p>
+          <a:p>
+            <a:r>
+              <a:rPr lang="hu-HU" dirty="0" err="1"/>
+              <a:t>dotenv</a:t>
+            </a:r>
+            <a:r>
+              <a:rPr lang="hu-HU" dirty="0"/>
+              <a:t> (.</a:t>
+            </a:r>
+            <a:r>
+              <a:rPr lang="hu-HU" dirty="0" err="1"/>
+              <a:t>env</a:t>
+            </a:r>
+            <a:r>
+              <a:rPr lang="hu-HU" dirty="0"/>
+              <a:t>)</a:t>
+            </a:r>
+          </a:p>
+          <a:p>
+            <a:r>
+              <a:rPr lang="hu-HU" dirty="0" err="1"/>
+              <a:t>Autentikáció</a:t>
+            </a:r>
+            <a:endParaRPr lang="hu-HU" dirty="0"/>
+          </a:p>
+          <a:p>
+            <a:pPr lvl="1"/>
+            <a:r>
+              <a:rPr lang="hu-HU" dirty="0"/>
+              <a:t>NextAuth.js</a:t>
+            </a:r>
+          </a:p>
+          <a:p>
+            <a:pPr lvl="1"/>
+            <a:r>
+              <a:rPr lang="hu-HU" dirty="0" err="1"/>
+              <a:t>Bcrypt</a:t>
+            </a:r>
+            <a:endParaRPr lang="hu-HU" dirty="0"/>
+          </a:p>
+          <a:p>
+            <a:r>
+              <a:rPr lang="hu-HU" dirty="0" err="1"/>
+              <a:t>Arduino</a:t>
+            </a:r>
+            <a:r>
+              <a:rPr lang="hu-HU" dirty="0"/>
+              <a:t> IDE</a:t>
+            </a:r>
           </a:p>
         </p:txBody>
       </p:sp>
@@ -5198,7 +6822,7 @@
         </p:blipFill>
         <p:spPr>
           <a:xfrm>
-            <a:off x="4847881" y="363805"/>
+            <a:off x="6404307" y="1027906"/>
             <a:ext cx="2133481" cy="4351338"/>
           </a:xfrm>
           <a:prstGeom prst="rect">

</xml_diff>